<commit_message>
o updated engine setup slides to include appending a path...
</commit_message>
<xml_diff>
--- a/HW1/Setup AftrBurnerEngine.pptx
+++ b/HW1/Setup AftrBurnerEngine.pptx
@@ -7,15 +7,16 @@
   <p:sldIdLst>
     <p:sldId id="257" r:id="rId2"/>
     <p:sldId id="258" r:id="rId3"/>
-    <p:sldId id="259" r:id="rId4"/>
-    <p:sldId id="260" r:id="rId5"/>
-    <p:sldId id="261" r:id="rId6"/>
-    <p:sldId id="262" r:id="rId7"/>
-    <p:sldId id="263" r:id="rId8"/>
-    <p:sldId id="264" r:id="rId9"/>
-    <p:sldId id="265" r:id="rId10"/>
-    <p:sldId id="266" r:id="rId11"/>
-    <p:sldId id="267" r:id="rId12"/>
+    <p:sldId id="268" r:id="rId4"/>
+    <p:sldId id="259" r:id="rId5"/>
+    <p:sldId id="260" r:id="rId6"/>
+    <p:sldId id="261" r:id="rId7"/>
+    <p:sldId id="262" r:id="rId8"/>
+    <p:sldId id="263" r:id="rId9"/>
+    <p:sldId id="264" r:id="rId10"/>
+    <p:sldId id="265" r:id="rId11"/>
+    <p:sldId id="266" r:id="rId12"/>
+    <p:sldId id="267" r:id="rId13"/>
   </p:sldIdLst>
   <p:sldSz cx="12192000" cy="6858000"/>
   <p:notesSz cx="6858000" cy="9144000"/>
@@ -253,7 +254,7 @@
           <a:p>
             <a:fld id="{6A5C7EF5-D49F-44E9-84F6-2101C1BE5C8A}" type="datetimeFigureOut">
               <a:rPr lang="en-US" smtClean="0"/>
-              <a:t>10/4/2019</a:t>
+              <a:t>10/7/2019</a:t>
             </a:fld>
             <a:endParaRPr lang="en-US"/>
           </a:p>
@@ -423,7 +424,7 @@
           <a:p>
             <a:fld id="{6A5C7EF5-D49F-44E9-84F6-2101C1BE5C8A}" type="datetimeFigureOut">
               <a:rPr lang="en-US" smtClean="0"/>
-              <a:t>10/4/2019</a:t>
+              <a:t>10/7/2019</a:t>
             </a:fld>
             <a:endParaRPr lang="en-US"/>
           </a:p>
@@ -603,7 +604,7 @@
           <a:p>
             <a:fld id="{6A5C7EF5-D49F-44E9-84F6-2101C1BE5C8A}" type="datetimeFigureOut">
               <a:rPr lang="en-US" smtClean="0"/>
-              <a:t>10/4/2019</a:t>
+              <a:t>10/7/2019</a:t>
             </a:fld>
             <a:endParaRPr lang="en-US"/>
           </a:p>
@@ -773,7 +774,7 @@
           <a:p>
             <a:fld id="{6A5C7EF5-D49F-44E9-84F6-2101C1BE5C8A}" type="datetimeFigureOut">
               <a:rPr lang="en-US" smtClean="0"/>
-              <a:t>10/4/2019</a:t>
+              <a:t>10/7/2019</a:t>
             </a:fld>
             <a:endParaRPr lang="en-US"/>
           </a:p>
@@ -1019,7 +1020,7 @@
           <a:p>
             <a:fld id="{6A5C7EF5-D49F-44E9-84F6-2101C1BE5C8A}" type="datetimeFigureOut">
               <a:rPr lang="en-US" smtClean="0"/>
-              <a:t>10/4/2019</a:t>
+              <a:t>10/7/2019</a:t>
             </a:fld>
             <a:endParaRPr lang="en-US"/>
           </a:p>
@@ -1251,7 +1252,7 @@
           <a:p>
             <a:fld id="{6A5C7EF5-D49F-44E9-84F6-2101C1BE5C8A}" type="datetimeFigureOut">
               <a:rPr lang="en-US" smtClean="0"/>
-              <a:t>10/4/2019</a:t>
+              <a:t>10/7/2019</a:t>
             </a:fld>
             <a:endParaRPr lang="en-US"/>
           </a:p>
@@ -1618,7 +1619,7 @@
           <a:p>
             <a:fld id="{6A5C7EF5-D49F-44E9-84F6-2101C1BE5C8A}" type="datetimeFigureOut">
               <a:rPr lang="en-US" smtClean="0"/>
-              <a:t>10/4/2019</a:t>
+              <a:t>10/7/2019</a:t>
             </a:fld>
             <a:endParaRPr lang="en-US"/>
           </a:p>
@@ -1736,7 +1737,7 @@
           <a:p>
             <a:fld id="{6A5C7EF5-D49F-44E9-84F6-2101C1BE5C8A}" type="datetimeFigureOut">
               <a:rPr lang="en-US" smtClean="0"/>
-              <a:t>10/4/2019</a:t>
+              <a:t>10/7/2019</a:t>
             </a:fld>
             <a:endParaRPr lang="en-US"/>
           </a:p>
@@ -1831,7 +1832,7 @@
           <a:p>
             <a:fld id="{6A5C7EF5-D49F-44E9-84F6-2101C1BE5C8A}" type="datetimeFigureOut">
               <a:rPr lang="en-US" smtClean="0"/>
-              <a:t>10/4/2019</a:t>
+              <a:t>10/7/2019</a:t>
             </a:fld>
             <a:endParaRPr lang="en-US"/>
           </a:p>
@@ -2108,7 +2109,7 @@
           <a:p>
             <a:fld id="{6A5C7EF5-D49F-44E9-84F6-2101C1BE5C8A}" type="datetimeFigureOut">
               <a:rPr lang="en-US" smtClean="0"/>
-              <a:t>10/4/2019</a:t>
+              <a:t>10/7/2019</a:t>
             </a:fld>
             <a:endParaRPr lang="en-US"/>
           </a:p>
@@ -2361,7 +2362,7 @@
           <a:p>
             <a:fld id="{6A5C7EF5-D49F-44E9-84F6-2101C1BE5C8A}" type="datetimeFigureOut">
               <a:rPr lang="en-US" smtClean="0"/>
-              <a:t>10/4/2019</a:t>
+              <a:t>10/7/2019</a:t>
             </a:fld>
             <a:endParaRPr lang="en-US"/>
           </a:p>
@@ -2574,7 +2575,7 @@
           <a:p>
             <a:fld id="{6A5C7EF5-D49F-44E9-84F6-2101C1BE5C8A}" type="datetimeFigureOut">
               <a:rPr lang="en-US" smtClean="0"/>
-              <a:t>10/4/2019</a:t>
+              <a:t>10/7/2019</a:t>
             </a:fld>
             <a:endParaRPr lang="en-US"/>
           </a:p>
@@ -3114,6 +3115,139 @@
             <p:ph type="title"/>
           </p:nvPr>
         </p:nvSpPr>
+        <p:spPr>
+          <a:xfrm>
+            <a:off x="114300" y="243840"/>
+            <a:ext cx="10515600" cy="677228"/>
+          </a:xfrm>
+        </p:spPr>
+        <p:txBody>
+          <a:bodyPr>
+            <a:normAutofit fontScale="90000"/>
+          </a:bodyPr>
+          <a:lstStyle/>
+          <a:p>
+            <a:r>
+              <a:rPr lang="en-US" dirty="0" smtClean="0"/>
+              <a:t>Enter aburn/usr/your.repo/HW1/cwin64</a:t>
+            </a:r>
+            <a:endParaRPr lang="en-US" dirty="0"/>
+          </a:p>
+        </p:txBody>
+      </p:sp>
+      <p:sp>
+        <p:nvSpPr>
+          <p:cNvPr id="6" name="Title 1"/>
+          <p:cNvSpPr txBox="1">
+            <a:spLocks/>
+          </p:cNvSpPr>
+          <p:nvPr/>
+        </p:nvSpPr>
+        <p:spPr>
+          <a:xfrm>
+            <a:off x="226529" y="3428161"/>
+            <a:ext cx="10515600" cy="677228"/>
+          </a:xfrm>
+          <a:prstGeom prst="rect">
+            <a:avLst/>
+          </a:prstGeom>
+        </p:spPr>
+        <p:txBody>
+          <a:bodyPr vert="horz" lIns="91440" tIns="45720" rIns="91440" bIns="45720" rtlCol="0" anchor="ctr">
+            <a:normAutofit fontScale="97500" lnSpcReduction="10000"/>
+          </a:bodyPr>
+          <a:lstStyle>
+            <a:lvl1pPr algn="l" defTabSz="914400" rtl="0" eaLnBrk="1" latinLnBrk="0" hangingPunct="1">
+              <a:lnSpc>
+                <a:spcPct val="90000"/>
+              </a:lnSpc>
+              <a:spcBef>
+                <a:spcPct val="0"/>
+              </a:spcBef>
+              <a:buNone/>
+              <a:defRPr sz="4400" kern="1200">
+                <a:solidFill>
+                  <a:schemeClr val="tx1"/>
+                </a:solidFill>
+                <a:latin typeface="+mj-lt"/>
+                <a:ea typeface="+mj-ea"/>
+                <a:cs typeface="+mj-cs"/>
+              </a:defRPr>
+            </a:lvl1pPr>
+          </a:lstStyle>
+          <a:p>
+            <a:r>
+              <a:rPr lang="en-US" dirty="0" smtClean="0"/>
+              <a:t>Open HW1.sln with MSVC 2019</a:t>
+            </a:r>
+            <a:endParaRPr lang="en-US" dirty="0"/>
+          </a:p>
+        </p:txBody>
+      </p:sp>
+      <p:pic>
+        <p:nvPicPr>
+          <p:cNvPr id="8" name="Picture 7"/>
+          <p:cNvPicPr>
+            <a:picLocks noChangeAspect="1"/>
+          </p:cNvPicPr>
+          <p:nvPr/>
+        </p:nvPicPr>
+        <p:blipFill>
+          <a:blip r:embed="rId2"/>
+          <a:stretch>
+            <a:fillRect/>
+          </a:stretch>
+        </p:blipFill>
+        <p:spPr>
+          <a:xfrm>
+            <a:off x="226529" y="859998"/>
+            <a:ext cx="3814141" cy="2568163"/>
+          </a:xfrm>
+          <a:prstGeom prst="rect">
+            <a:avLst/>
+          </a:prstGeom>
+        </p:spPr>
+      </p:pic>
+    </p:spTree>
+    <p:extLst>
+      <p:ext uri="{BB962C8B-B14F-4D97-AF65-F5344CB8AC3E}">
+        <p14:creationId xmlns:p14="http://schemas.microsoft.com/office/powerpoint/2010/main" val="828569764"/>
+      </p:ext>
+    </p:extLst>
+  </p:cSld>
+  <p:clrMapOvr>
+    <a:masterClrMapping/>
+  </p:clrMapOvr>
+</p:sld>
+</file>
+
+<file path=ppt/slides/slide11.xml><?xml version="1.0" encoding="utf-8"?>
+<p:sld xmlns:a="http://schemas.openxmlformats.org/drawingml/2006/main" xmlns:r="http://schemas.openxmlformats.org/officeDocument/2006/relationships" xmlns:p="http://schemas.openxmlformats.org/presentationml/2006/main">
+  <p:cSld>
+    <p:spTree>
+      <p:nvGrpSpPr>
+        <p:cNvPr id="1" name=""/>
+        <p:cNvGrpSpPr/>
+        <p:nvPr/>
+      </p:nvGrpSpPr>
+      <p:grpSpPr>
+        <a:xfrm>
+          <a:off x="0" y="0"/>
+          <a:ext cx="0" cy="0"/>
+          <a:chOff x="0" y="0"/>
+          <a:chExt cx="0" cy="0"/>
+        </a:xfrm>
+      </p:grpSpPr>
+      <p:sp>
+        <p:nvSpPr>
+          <p:cNvPr id="2" name="Title 1"/>
+          <p:cNvSpPr>
+            <a:spLocks noGrp="1"/>
+          </p:cNvSpPr>
+          <p:nvPr>
+            <p:ph type="title"/>
+          </p:nvPr>
+        </p:nvSpPr>
         <p:spPr/>
         <p:txBody>
           <a:bodyPr/>
@@ -3166,7 +3300,7 @@
 </p:sld>
 </file>
 
-<file path=ppt/slides/slide11.xml><?xml version="1.0" encoding="utf-8"?>
+<file path=ppt/slides/slide12.xml><?xml version="1.0" encoding="utf-8"?>
 <p:sld xmlns:a="http://schemas.openxmlformats.org/drawingml/2006/main" xmlns:r="http://schemas.openxmlformats.org/officeDocument/2006/relationships" xmlns:p="http://schemas.openxmlformats.org/presentationml/2006/main">
   <p:cSld>
     <p:spTree>
@@ -3479,7 +3613,54 @@
             <p:ph type="title"/>
           </p:nvPr>
         </p:nvSpPr>
-        <p:spPr/>
+        <p:spPr>
+          <a:xfrm>
+            <a:off x="838200" y="365126"/>
+            <a:ext cx="10515600" cy="688228"/>
+          </a:xfrm>
+        </p:spPr>
+        <p:txBody>
+          <a:bodyPr>
+            <a:normAutofit fontScale="90000"/>
+          </a:bodyPr>
+          <a:lstStyle/>
+          <a:p>
+            <a:r>
+              <a:rPr lang="en-US" dirty="0" smtClean="0"/>
+              <a:t>Set Environment Path </a:t>
+            </a:r>
+            <a:r>
+              <a:rPr lang="en-US" dirty="0" smtClean="0"/>
+              <a:t>to include </a:t>
+            </a:r>
+            <a:r>
+              <a:rPr lang="en-US" dirty="0" err="1" smtClean="0"/>
+              <a:t>usr</a:t>
+            </a:r>
+            <a:r>
+              <a:rPr lang="en-US" dirty="0" smtClean="0"/>
+              <a:t>/lib64</a:t>
+            </a:r>
+            <a:endParaRPr lang="en-US" dirty="0"/>
+          </a:p>
+        </p:txBody>
+      </p:sp>
+      <p:sp>
+        <p:nvSpPr>
+          <p:cNvPr id="3" name="Content Placeholder 2"/>
+          <p:cNvSpPr>
+            <a:spLocks noGrp="1"/>
+          </p:cNvSpPr>
+          <p:nvPr>
+            <p:ph idx="1"/>
+          </p:nvPr>
+        </p:nvSpPr>
+        <p:spPr>
+          <a:xfrm>
+            <a:off x="667870" y="933637"/>
+            <a:ext cx="10515600" cy="4351338"/>
+          </a:xfrm>
+        </p:spPr>
         <p:txBody>
           <a:bodyPr>
             <a:normAutofit/>
@@ -3487,29 +3668,47 @@
           <a:lstStyle/>
           <a:p>
             <a:r>
-              <a:rPr lang="en-US" sz="2800" dirty="0" smtClean="0"/>
-              <a:t>Ensure Cmake is installed and resides in your machine’s PATH</a:t>
-            </a:r>
-            <a:endParaRPr lang="en-US" sz="2800" dirty="0"/>
-          </a:p>
-        </p:txBody>
-      </p:sp>
-      <p:sp>
-        <p:nvSpPr>
-          <p:cNvPr id="3" name="Content Placeholder 2"/>
-          <p:cNvSpPr>
-            <a:spLocks noGrp="1"/>
-          </p:cNvSpPr>
-          <p:nvPr>
-            <p:ph idx="1"/>
-          </p:nvPr>
-        </p:nvSpPr>
-        <p:spPr/>
-        <p:txBody>
-          <a:bodyPr/>
-          <a:lstStyle/>
-          <a:p>
-            <a:endParaRPr lang="en-US"/>
+              <a:rPr lang="en-US" sz="2400" dirty="0" smtClean="0"/>
+              <a:t>Control Panel </a:t>
+            </a:r>
+            <a:r>
+              <a:rPr lang="en-US" sz="2400" dirty="0" smtClean="0">
+                <a:sym typeface="Wingdings" panose="05000000000000000000" pitchFamily="2" charset="2"/>
+              </a:rPr>
+              <a:t></a:t>
+            </a:r>
+            <a:r>
+              <a:rPr lang="en-US" sz="2400" dirty="0" smtClean="0"/>
+              <a:t> System </a:t>
+            </a:r>
+            <a:r>
+              <a:rPr lang="en-US" sz="2400" dirty="0" smtClean="0">
+                <a:sym typeface="Wingdings" panose="05000000000000000000" pitchFamily="2" charset="2"/>
+              </a:rPr>
+              <a:t></a:t>
+            </a:r>
+            <a:r>
+              <a:rPr lang="en-US" sz="2400" dirty="0" smtClean="0"/>
+              <a:t> Advanced System Settings</a:t>
+            </a:r>
+            <a:r>
+              <a:rPr lang="en-US" sz="2400" dirty="0" smtClean="0">
+                <a:sym typeface="Wingdings" panose="05000000000000000000" pitchFamily="2" charset="2"/>
+              </a:rPr>
+              <a:t></a:t>
+            </a:r>
+            <a:r>
+              <a:rPr lang="en-US" sz="2400" dirty="0" smtClean="0"/>
+              <a:t> Environment Variables</a:t>
+            </a:r>
+          </a:p>
+          <a:p>
+            <a:pPr lvl="1"/>
+            <a:r>
+              <a:rPr lang="en-US" sz="2000" dirty="0" smtClean="0"/>
+              <a:t>Append to PATH C:\repos\aburn\usr\lib64</a:t>
+            </a:r>
+            <a:endParaRPr lang="en-US" sz="2000" dirty="0"/>
           </a:p>
         </p:txBody>
       </p:sp>
@@ -3529,18 +3728,170 @@
         </p:blipFill>
         <p:spPr>
           <a:xfrm>
-            <a:off x="641033" y="1690688"/>
-            <a:ext cx="8381047" cy="4251256"/>
+            <a:off x="7202788" y="1771411"/>
+            <a:ext cx="4065847" cy="4471350"/>
           </a:xfrm>
           <a:prstGeom prst="rect">
             <a:avLst/>
           </a:prstGeom>
         </p:spPr>
       </p:pic>
+      <p:pic>
+        <p:nvPicPr>
+          <p:cNvPr id="5" name="Picture 4"/>
+          <p:cNvPicPr>
+            <a:picLocks noChangeAspect="1"/>
+          </p:cNvPicPr>
+          <p:nvPr/>
+        </p:nvPicPr>
+        <p:blipFill>
+          <a:blip r:embed="rId3" cstate="screen">
+            <a:extLst>
+              <a:ext uri="{28A0092B-C50C-407E-A947-70E740481C1C}">
+                <a14:useLocalDpi xmlns:a14="http://schemas.microsoft.com/office/drawing/2010/main"/>
+              </a:ext>
+            </a:extLst>
+          </a:blip>
+          <a:stretch>
+            <a:fillRect/>
+          </a:stretch>
+        </p:blipFill>
+        <p:spPr>
+          <a:xfrm>
+            <a:off x="1368019" y="2115746"/>
+            <a:ext cx="3856278" cy="4232287"/>
+          </a:xfrm>
+          <a:prstGeom prst="rect">
+            <a:avLst/>
+          </a:prstGeom>
+        </p:spPr>
+      </p:pic>
+      <p:cxnSp>
+        <p:nvCxnSpPr>
+          <p:cNvPr id="8" name="Straight Arrow Connector 7"/>
+          <p:cNvCxnSpPr>
+            <a:endCxn id="9" idx="3"/>
+          </p:cNvCxnSpPr>
+          <p:nvPr/>
+        </p:nvCxnSpPr>
+        <p:spPr>
+          <a:xfrm flipV="1">
+            <a:off x="4303314" y="2433071"/>
+            <a:ext cx="6079741" cy="3313348"/>
+          </a:xfrm>
+          <a:prstGeom prst="straightConnector1">
+            <a:avLst/>
+          </a:prstGeom>
+          <a:ln w="63500">
+            <a:solidFill>
+              <a:srgbClr val="FF0000"/>
+            </a:solidFill>
+            <a:tailEnd type="triangle"/>
+          </a:ln>
+        </p:spPr>
+        <p:style>
+          <a:lnRef idx="1">
+            <a:schemeClr val="accent1"/>
+          </a:lnRef>
+          <a:fillRef idx="0">
+            <a:schemeClr val="accent1"/>
+          </a:fillRef>
+          <a:effectRef idx="0">
+            <a:schemeClr val="accent1"/>
+          </a:effectRef>
+          <a:fontRef idx="minor">
+            <a:schemeClr val="tx1"/>
+          </a:fontRef>
+        </p:style>
+      </p:cxnSp>
+      <p:sp>
+        <p:nvSpPr>
+          <p:cNvPr id="9" name="Oval 8"/>
+          <p:cNvSpPr/>
+          <p:nvPr/>
+        </p:nvSpPr>
+        <p:spPr>
+          <a:xfrm>
+            <a:off x="10216502" y="2115746"/>
+            <a:ext cx="1137298" cy="371769"/>
+          </a:xfrm>
+          <a:prstGeom prst="ellipse">
+            <a:avLst/>
+          </a:prstGeom>
+          <a:noFill/>
+          <a:ln>
+            <a:solidFill>
+              <a:srgbClr val="FF0000"/>
+            </a:solidFill>
+          </a:ln>
+        </p:spPr>
+        <p:style>
+          <a:lnRef idx="2">
+            <a:schemeClr val="accent1">
+              <a:shade val="50000"/>
+            </a:schemeClr>
+          </a:lnRef>
+          <a:fillRef idx="1">
+            <a:schemeClr val="accent1"/>
+          </a:fillRef>
+          <a:effectRef idx="0">
+            <a:schemeClr val="accent1"/>
+          </a:effectRef>
+          <a:fontRef idx="minor">
+            <a:schemeClr val="lt1"/>
+          </a:fontRef>
+        </p:style>
+        <p:txBody>
+          <a:bodyPr rtlCol="0" anchor="ctr"/>
+          <a:lstStyle/>
+          <a:p>
+            <a:pPr algn="ctr"/>
+            <a:endParaRPr lang="en-US"/>
+          </a:p>
+        </p:txBody>
+      </p:sp>
+      <p:cxnSp>
+        <p:nvCxnSpPr>
+          <p:cNvPr id="13" name="Straight Arrow Connector 12"/>
+          <p:cNvCxnSpPr>
+            <a:stCxn id="9" idx="2"/>
+          </p:cNvCxnSpPr>
+          <p:nvPr/>
+        </p:nvCxnSpPr>
+        <p:spPr>
+          <a:xfrm flipH="1" flipV="1">
+            <a:off x="8528622" y="2301630"/>
+            <a:ext cx="1687880" cy="1"/>
+          </a:xfrm>
+          <a:prstGeom prst="straightConnector1">
+            <a:avLst/>
+          </a:prstGeom>
+          <a:ln w="63500">
+            <a:solidFill>
+              <a:srgbClr val="FF0000"/>
+            </a:solidFill>
+            <a:tailEnd type="triangle"/>
+          </a:ln>
+        </p:spPr>
+        <p:style>
+          <a:lnRef idx="1">
+            <a:schemeClr val="accent1"/>
+          </a:lnRef>
+          <a:fillRef idx="0">
+            <a:schemeClr val="accent1"/>
+          </a:fillRef>
+          <a:effectRef idx="0">
+            <a:schemeClr val="accent1"/>
+          </a:effectRef>
+          <a:fontRef idx="minor">
+            <a:schemeClr val="tx1"/>
+          </a:fontRef>
+        </p:style>
+      </p:cxnSp>
     </p:spTree>
     <p:extLst>
       <p:ext uri="{BB962C8B-B14F-4D97-AF65-F5344CB8AC3E}">
-        <p14:creationId xmlns:p14="http://schemas.microsoft.com/office/powerpoint/2010/main" val="560431747"/>
+        <p14:creationId xmlns:p14="http://schemas.microsoft.com/office/powerpoint/2010/main" val="3535179723"/>
       </p:ext>
     </p:extLst>
   </p:cSld>
@@ -3579,14 +3930,16 @@
         </p:nvSpPr>
         <p:spPr/>
         <p:txBody>
-          <a:bodyPr/>
-          <a:lstStyle/>
-          <a:p>
-            <a:r>
-              <a:rPr lang="en-US" dirty="0" smtClean="0"/>
-              <a:t>Run c:\repos\aburn\engine\RUN</a:t>
-            </a:r>
-            <a:endParaRPr lang="en-US" dirty="0"/>
+          <a:bodyPr>
+            <a:normAutofit/>
+          </a:bodyPr>
+          <a:lstStyle/>
+          <a:p>
+            <a:r>
+              <a:rPr lang="en-US" sz="2800" dirty="0" smtClean="0"/>
+              <a:t>Ensure Cmake is installed and resides in your machine’s PATH</a:t>
+            </a:r>
+            <a:endParaRPr lang="en-US" sz="2800" dirty="0"/>
           </a:p>
         </p:txBody>
       </p:sp>
@@ -3605,24 +3958,13 @@
           <a:bodyPr/>
           <a:lstStyle/>
           <a:p>
-            <a:r>
-              <a:rPr lang="en-US" dirty="0" smtClean="0"/>
-              <a:t>Run C:\repos\aburn\engine\BUILD 64 BIT MSVC 2019.bat</a:t>
-            </a:r>
-          </a:p>
-          <a:p>
-            <a:pPr lvl="1"/>
-            <a:r>
-              <a:rPr lang="en-US" dirty="0" smtClean="0"/>
-              <a:t>Open a CMD window or double click the .bat file</a:t>
-            </a:r>
-            <a:endParaRPr lang="en-US" dirty="0"/>
+            <a:endParaRPr lang="en-US"/>
           </a:p>
         </p:txBody>
       </p:sp>
       <p:pic>
         <p:nvPicPr>
-          <p:cNvPr id="5" name="Picture 4"/>
+          <p:cNvPr id="4" name="Picture 3"/>
           <p:cNvPicPr>
             <a:picLocks noChangeAspect="1"/>
           </p:cNvPicPr>
@@ -3636,8 +3978,8 @@
         </p:blipFill>
         <p:spPr>
           <a:xfrm>
-            <a:off x="439777" y="2851857"/>
-            <a:ext cx="3817951" cy="3494073"/>
+            <a:off x="641033" y="1690688"/>
+            <a:ext cx="8381047" cy="4251256"/>
           </a:xfrm>
           <a:prstGeom prst="rect">
             <a:avLst/>
@@ -3647,7 +3989,7 @@
     </p:spTree>
     <p:extLst>
       <p:ext uri="{BB962C8B-B14F-4D97-AF65-F5344CB8AC3E}">
-        <p14:creationId xmlns:p14="http://schemas.microsoft.com/office/powerpoint/2010/main" val="1214179798"/>
+        <p14:creationId xmlns:p14="http://schemas.microsoft.com/office/powerpoint/2010/main" val="560431747"/>
       </p:ext>
     </p:extLst>
   </p:cSld>
@@ -3684,23 +4026,48 @@
             <p:ph type="title"/>
           </p:nvPr>
         </p:nvSpPr>
-        <p:spPr>
-          <a:xfrm>
-            <a:off x="883024" y="0"/>
-            <a:ext cx="10515600" cy="1325563"/>
-          </a:xfrm>
-        </p:spPr>
-        <p:txBody>
-          <a:bodyPr>
-            <a:normAutofit/>
-          </a:bodyPr>
-          <a:lstStyle/>
-          <a:p>
-            <a:r>
-              <a:rPr lang="en-US" sz="4000" dirty="0" smtClean="0"/>
-              <a:t>After the BAT finishes a cwin64 folder will exist</a:t>
-            </a:r>
-            <a:endParaRPr lang="en-US" sz="4000" dirty="0"/>
+        <p:spPr/>
+        <p:txBody>
+          <a:bodyPr/>
+          <a:lstStyle/>
+          <a:p>
+            <a:r>
+              <a:rPr lang="en-US" dirty="0" smtClean="0"/>
+              <a:t>Build </a:t>
+            </a:r>
+            <a:r>
+              <a:rPr lang="en-US" dirty="0" err="1" smtClean="0"/>
+              <a:t>CMake</a:t>
+            </a:r>
+            <a:r>
+              <a:rPr lang="en-US" dirty="0" smtClean="0"/>
+              <a:t> .</a:t>
+            </a:r>
+            <a:r>
+              <a:rPr lang="en-US" dirty="0" err="1" smtClean="0"/>
+              <a:t>sln</a:t>
+            </a:r>
+            <a:r>
+              <a:rPr lang="en-US" dirty="0" smtClean="0"/>
+              <a:t> </a:t>
+            </a:r>
+            <a:r>
+              <a:rPr lang="en-US" dirty="0" err="1" smtClean="0"/>
+              <a:t>proj</a:t>
+            </a:r>
+            <a:r>
+              <a:rPr lang="en-US" dirty="0" smtClean="0"/>
+              <a:t> c</a:t>
+            </a:r>
+            <a:r>
+              <a:rPr lang="en-US" dirty="0" smtClean="0"/>
+              <a:t>:\</a:t>
+            </a:r>
+            <a:r>
+              <a:rPr lang="en-US" dirty="0" smtClean="0"/>
+              <a:t>repos\aburn\engine\</a:t>
+            </a:r>
+            <a:endParaRPr lang="en-US" dirty="0"/>
           </a:p>
         </p:txBody>
       </p:sp>
@@ -3714,29 +4081,29 @@
             <p:ph idx="1"/>
           </p:nvPr>
         </p:nvSpPr>
-        <p:spPr>
-          <a:xfrm>
-            <a:off x="667871" y="875366"/>
-            <a:ext cx="10515600" cy="4351338"/>
-          </a:xfrm>
-        </p:spPr>
+        <p:spPr/>
         <p:txBody>
           <a:bodyPr/>
           <a:lstStyle/>
           <a:p>
             <a:r>
               <a:rPr lang="en-US" dirty="0" smtClean="0"/>
-              <a:t>No need to do anything with this GUI (unless trouble shooting your build problem):</a:t>
-            </a:r>
-          </a:p>
-          <a:p>
+              <a:t>Run C:\repos\aburn\engine\BUILD 64 BIT MSVC 2019.bat</a:t>
+            </a:r>
+          </a:p>
+          <a:p>
+            <a:pPr lvl="1"/>
+            <a:r>
+              <a:rPr lang="en-US" dirty="0" smtClean="0"/>
+              <a:t>Open a CMD window or double click the .bat file</a:t>
+            </a:r>
             <a:endParaRPr lang="en-US" dirty="0"/>
           </a:p>
         </p:txBody>
       </p:sp>
       <p:pic>
         <p:nvPicPr>
-          <p:cNvPr id="4" name="Picture 3"/>
+          <p:cNvPr id="5" name="Picture 4"/>
           <p:cNvPicPr>
             <a:picLocks noChangeAspect="1"/>
           </p:cNvPicPr>
@@ -3750,8 +4117,8 @@
         </p:blipFill>
         <p:spPr>
           <a:xfrm>
-            <a:off x="3443830" y="1402087"/>
-            <a:ext cx="4906793" cy="5264208"/>
+            <a:off x="439777" y="2851857"/>
+            <a:ext cx="3817951" cy="3494073"/>
           </a:xfrm>
           <a:prstGeom prst="rect">
             <a:avLst/>
@@ -3761,7 +4128,7 @@
     </p:spTree>
     <p:extLst>
       <p:ext uri="{BB962C8B-B14F-4D97-AF65-F5344CB8AC3E}">
-        <p14:creationId xmlns:p14="http://schemas.microsoft.com/office/powerpoint/2010/main" val="2676976137"/>
+        <p14:creationId xmlns:p14="http://schemas.microsoft.com/office/powerpoint/2010/main" val="1214179798"/>
       </p:ext>
     </p:extLst>
   </p:cSld>
@@ -3798,35 +4165,53 @@
             <p:ph type="title"/>
           </p:nvPr>
         </p:nvSpPr>
-        <p:spPr/>
+        <p:spPr>
+          <a:xfrm>
+            <a:off x="883024" y="0"/>
+            <a:ext cx="10515600" cy="1325563"/>
+          </a:xfrm>
+        </p:spPr>
+        <p:txBody>
+          <a:bodyPr>
+            <a:normAutofit/>
+          </a:bodyPr>
+          <a:lstStyle/>
+          <a:p>
+            <a:r>
+              <a:rPr lang="en-US" sz="4000" dirty="0" smtClean="0"/>
+              <a:t>After the BAT finishes a cwin64 folder will exist</a:t>
+            </a:r>
+            <a:endParaRPr lang="en-US" sz="4000" dirty="0"/>
+          </a:p>
+        </p:txBody>
+      </p:sp>
+      <p:sp>
+        <p:nvSpPr>
+          <p:cNvPr id="3" name="Content Placeholder 2"/>
+          <p:cNvSpPr>
+            <a:spLocks noGrp="1"/>
+          </p:cNvSpPr>
+          <p:nvPr>
+            <p:ph idx="1"/>
+          </p:nvPr>
+        </p:nvSpPr>
+        <p:spPr>
+          <a:xfrm>
+            <a:off x="667871" y="875366"/>
+            <a:ext cx="10515600" cy="4351338"/>
+          </a:xfrm>
+        </p:spPr>
         <p:txBody>
           <a:bodyPr/>
           <a:lstStyle/>
           <a:p>
             <a:r>
               <a:rPr lang="en-US" dirty="0" smtClean="0"/>
-              <a:t>Open the .sln inside the cwin64 folder</a:t>
-            </a:r>
+              <a:t>No need to do anything with this GUI (unless trouble shooting your build problem):</a:t>
+            </a:r>
+          </a:p>
+          <a:p>
             <a:endParaRPr lang="en-US" dirty="0"/>
-          </a:p>
-        </p:txBody>
-      </p:sp>
-      <p:sp>
-        <p:nvSpPr>
-          <p:cNvPr id="3" name="Content Placeholder 2"/>
-          <p:cNvSpPr>
-            <a:spLocks noGrp="1"/>
-          </p:cNvSpPr>
-          <p:nvPr>
-            <p:ph idx="1"/>
-          </p:nvPr>
-        </p:nvSpPr>
-        <p:spPr/>
-        <p:txBody>
-          <a:bodyPr/>
-          <a:lstStyle/>
-          <a:p>
-            <a:endParaRPr lang="en-US"/>
           </a:p>
         </p:txBody>
       </p:sp>
@@ -3846,8 +4231,8 @@
         </p:blipFill>
         <p:spPr>
           <a:xfrm>
-            <a:off x="712856" y="1529557"/>
-            <a:ext cx="4042760" cy="3646486"/>
+            <a:off x="3443830" y="1402087"/>
+            <a:ext cx="4906793" cy="5264208"/>
           </a:xfrm>
           <a:prstGeom prst="rect">
             <a:avLst/>
@@ -3857,7 +4242,7 @@
     </p:spTree>
     <p:extLst>
       <p:ext uri="{BB962C8B-B14F-4D97-AF65-F5344CB8AC3E}">
-        <p14:creationId xmlns:p14="http://schemas.microsoft.com/office/powerpoint/2010/main" val="2337230069"/>
+        <p14:creationId xmlns:p14="http://schemas.microsoft.com/office/powerpoint/2010/main" val="2676976137"/>
       </p:ext>
     </p:extLst>
   </p:cSld>
@@ -3901,13 +4286,7 @@
           <a:p>
             <a:r>
               <a:rPr lang="en-US" dirty="0" smtClean="0"/>
-              <a:t>Build</a:t>
-            </a:r>
-            <a:r>
-              <a:rPr lang="en-US" dirty="0" smtClean="0">
-                <a:sym typeface="Wingdings" panose="05000000000000000000" pitchFamily="2" charset="2"/>
-              </a:rPr>
-              <a:t>Batch Build</a:t>
+              <a:t>Open the .sln inside the cwin64 folder</a:t>
             </a:r>
             <a:endParaRPr lang="en-US" dirty="0"/>
           </a:p>
@@ -3928,19 +4307,7 @@
           <a:bodyPr/>
           <a:lstStyle/>
           <a:p>
-            <a:r>
-              <a:rPr lang="en-US" dirty="0" smtClean="0"/>
-              <a:t>Check INSTALL Debug and INSTALL MinSizeRel</a:t>
-            </a:r>
-          </a:p>
-          <a:p>
-            <a:r>
-              <a:rPr lang="en-US" dirty="0" smtClean="0"/>
-              <a:t>Click Build</a:t>
-            </a:r>
-          </a:p>
-          <a:p>
-            <a:endParaRPr lang="en-US" dirty="0"/>
+            <a:endParaRPr lang="en-US"/>
           </a:p>
         </p:txBody>
       </p:sp>
@@ -3960,8 +4327,8 @@
         </p:blipFill>
         <p:spPr>
           <a:xfrm>
-            <a:off x="3605212" y="2278380"/>
-            <a:ext cx="6933248" cy="4464995"/>
+            <a:off x="712856" y="1529557"/>
+            <a:ext cx="4042760" cy="3646486"/>
           </a:xfrm>
           <a:prstGeom prst="rect">
             <a:avLst/>
@@ -3971,7 +4338,7 @@
     </p:spTree>
     <p:extLst>
       <p:ext uri="{BB962C8B-B14F-4D97-AF65-F5344CB8AC3E}">
-        <p14:creationId xmlns:p14="http://schemas.microsoft.com/office/powerpoint/2010/main" val="529133392"/>
+        <p14:creationId xmlns:p14="http://schemas.microsoft.com/office/powerpoint/2010/main" val="2337230069"/>
       </p:ext>
     </p:extLst>
   </p:cSld>
@@ -4008,35 +4375,63 @@
             <p:ph type="title"/>
           </p:nvPr>
         </p:nvSpPr>
-        <p:spPr>
-          <a:xfrm>
-            <a:off x="114300" y="243840"/>
-            <a:ext cx="10515600" cy="677228"/>
-          </a:xfrm>
-        </p:spPr>
-        <p:txBody>
-          <a:bodyPr>
-            <a:normAutofit fontScale="90000"/>
-          </a:bodyPr>
+        <p:spPr/>
+        <p:txBody>
+          <a:bodyPr/>
           <a:lstStyle/>
           <a:p>
             <a:r>
               <a:rPr lang="en-US" dirty="0" smtClean="0"/>
-              <a:t>Move your csce593 repo to aburn/usr</a:t>
-            </a:r>
+              <a:t>Build</a:t>
+            </a:r>
+            <a:r>
+              <a:rPr lang="en-US" dirty="0" smtClean="0">
+                <a:sym typeface="Wingdings" panose="05000000000000000000" pitchFamily="2" charset="2"/>
+              </a:rPr>
+              <a:t>Batch Build</a:t>
+            </a:r>
+            <a:endParaRPr lang="en-US" dirty="0"/>
+          </a:p>
+        </p:txBody>
+      </p:sp>
+      <p:sp>
+        <p:nvSpPr>
+          <p:cNvPr id="3" name="Content Placeholder 2"/>
+          <p:cNvSpPr>
+            <a:spLocks noGrp="1"/>
+          </p:cNvSpPr>
+          <p:nvPr>
+            <p:ph idx="1"/>
+          </p:nvPr>
+        </p:nvSpPr>
+        <p:spPr/>
+        <p:txBody>
+          <a:bodyPr/>
+          <a:lstStyle/>
+          <a:p>
+            <a:r>
+              <a:rPr lang="en-US" dirty="0" smtClean="0"/>
+              <a:t>Check INSTALL Debug and INSTALL MinSizeRel</a:t>
+            </a:r>
+          </a:p>
+          <a:p>
+            <a:r>
+              <a:rPr lang="en-US" dirty="0" smtClean="0"/>
+              <a:t>Click Build</a:t>
+            </a:r>
+          </a:p>
+          <a:p>
             <a:endParaRPr lang="en-US" dirty="0"/>
           </a:p>
         </p:txBody>
       </p:sp>
       <p:pic>
         <p:nvPicPr>
-          <p:cNvPr id="4" name="Content Placeholder 3"/>
+          <p:cNvPr id="4" name="Picture 3"/>
           <p:cNvPicPr>
-            <a:picLocks noGrp="1" noChangeAspect="1"/>
+            <a:picLocks noChangeAspect="1"/>
           </p:cNvPicPr>
-          <p:nvPr>
-            <p:ph idx="1"/>
-          </p:nvPr>
+          <p:nvPr/>
         </p:nvPicPr>
         <p:blipFill>
           <a:blip r:embed="rId2"/>
@@ -4046,81 +4441,8 @@
         </p:blipFill>
         <p:spPr>
           <a:xfrm>
-            <a:off x="259080" y="921068"/>
-            <a:ext cx="3897968" cy="2221423"/>
-          </a:xfrm>
-          <a:prstGeom prst="rect">
-            <a:avLst/>
-          </a:prstGeom>
-        </p:spPr>
-      </p:pic>
-      <p:sp>
-        <p:nvSpPr>
-          <p:cNvPr id="6" name="Title 1"/>
-          <p:cNvSpPr txBox="1">
-            <a:spLocks/>
-          </p:cNvSpPr>
-          <p:nvPr/>
-        </p:nvSpPr>
-        <p:spPr>
-          <a:xfrm>
-            <a:off x="114300" y="3229508"/>
-            <a:ext cx="10515600" cy="677228"/>
-          </a:xfrm>
-          <a:prstGeom prst="rect">
-            <a:avLst/>
-          </a:prstGeom>
-        </p:spPr>
-        <p:txBody>
-          <a:bodyPr vert="horz" lIns="91440" tIns="45720" rIns="91440" bIns="45720" rtlCol="0" anchor="ctr">
-            <a:normAutofit fontScale="82500" lnSpcReduction="10000"/>
-          </a:bodyPr>
-          <a:lstStyle>
-            <a:lvl1pPr algn="l" defTabSz="914400" rtl="0" eaLnBrk="1" latinLnBrk="0" hangingPunct="1">
-              <a:lnSpc>
-                <a:spcPct val="90000"/>
-              </a:lnSpc>
-              <a:spcBef>
-                <a:spcPct val="0"/>
-              </a:spcBef>
-              <a:buNone/>
-              <a:defRPr sz="4400" kern="1200">
-                <a:solidFill>
-                  <a:schemeClr val="tx1"/>
-                </a:solidFill>
-                <a:latin typeface="+mj-lt"/>
-                <a:ea typeface="+mj-ea"/>
-                <a:cs typeface="+mj-cs"/>
-              </a:defRPr>
-            </a:lvl1pPr>
-          </a:lstStyle>
-          <a:p>
-            <a:r>
-              <a:rPr lang="en-US" dirty="0" smtClean="0"/>
-              <a:t>Go into aburn/usr/your.repo/HW1 and Run .bat file</a:t>
-            </a:r>
-            <a:endParaRPr lang="en-US" dirty="0"/>
-          </a:p>
-        </p:txBody>
-      </p:sp>
-      <p:pic>
-        <p:nvPicPr>
-          <p:cNvPr id="7" name="Picture 6"/>
-          <p:cNvPicPr>
-            <a:picLocks noChangeAspect="1"/>
-          </p:cNvPicPr>
-          <p:nvPr/>
-        </p:nvPicPr>
-        <p:blipFill>
-          <a:blip r:embed="rId3"/>
-          <a:stretch>
-            <a:fillRect/>
-          </a:stretch>
-        </p:blipFill>
-        <p:spPr>
-          <a:xfrm>
-            <a:off x="342732" y="3886927"/>
-            <a:ext cx="3871295" cy="1630821"/>
+            <a:off x="3605212" y="2278380"/>
+            <a:ext cx="6933248" cy="4464995"/>
           </a:xfrm>
           <a:prstGeom prst="rect">
             <a:avLst/>
@@ -4130,7 +4452,7 @@
     </p:spTree>
     <p:extLst>
       <p:ext uri="{BB962C8B-B14F-4D97-AF65-F5344CB8AC3E}">
-        <p14:creationId xmlns:p14="http://schemas.microsoft.com/office/powerpoint/2010/main" val="2705974047"/>
+        <p14:creationId xmlns:p14="http://schemas.microsoft.com/office/powerpoint/2010/main" val="529133392"/>
       </p:ext>
     </p:extLst>
   </p:cSld>
@@ -4181,12 +4503,38 @@
           <a:p>
             <a:r>
               <a:rPr lang="en-US" dirty="0" smtClean="0"/>
-              <a:t>Enter aburn/usr/your.repo/HW1/cwin64</a:t>
+              <a:t>Move your csce593 repo to aburn/usr</a:t>
             </a:r>
             <a:endParaRPr lang="en-US" dirty="0"/>
           </a:p>
         </p:txBody>
       </p:sp>
+      <p:pic>
+        <p:nvPicPr>
+          <p:cNvPr id="4" name="Content Placeholder 3"/>
+          <p:cNvPicPr>
+            <a:picLocks noGrp="1" noChangeAspect="1"/>
+          </p:cNvPicPr>
+          <p:nvPr>
+            <p:ph idx="1"/>
+          </p:nvPr>
+        </p:nvPicPr>
+        <p:blipFill>
+          <a:blip r:embed="rId2"/>
+          <a:stretch>
+            <a:fillRect/>
+          </a:stretch>
+        </p:blipFill>
+        <p:spPr>
+          <a:xfrm>
+            <a:off x="259080" y="921068"/>
+            <a:ext cx="3897968" cy="2221423"/>
+          </a:xfrm>
+          <a:prstGeom prst="rect">
+            <a:avLst/>
+          </a:prstGeom>
+        </p:spPr>
+      </p:pic>
       <p:sp>
         <p:nvSpPr>
           <p:cNvPr id="6" name="Title 1"/>
@@ -4197,7 +4545,7 @@
         </p:nvSpPr>
         <p:spPr>
           <a:xfrm>
-            <a:off x="226529" y="3428161"/>
+            <a:off x="114300" y="3229508"/>
             <a:ext cx="10515600" cy="677228"/>
           </a:xfrm>
           <a:prstGeom prst="rect">
@@ -4206,7 +4554,7 @@
         </p:spPr>
         <p:txBody>
           <a:bodyPr vert="horz" lIns="91440" tIns="45720" rIns="91440" bIns="45720" rtlCol="0" anchor="ctr">
-            <a:normAutofit fontScale="97500" lnSpcReduction="10000"/>
+            <a:normAutofit fontScale="82500" lnSpcReduction="10000"/>
           </a:bodyPr>
           <a:lstStyle>
             <a:lvl1pPr algn="l" defTabSz="914400" rtl="0" eaLnBrk="1" latinLnBrk="0" hangingPunct="1">
@@ -4230,7 +4578,7 @@
           <a:p>
             <a:r>
               <a:rPr lang="en-US" dirty="0" smtClean="0"/>
-              <a:t>Open HW1.sln with MSVC 2019</a:t>
+              <a:t>Go into aburn/usr/your.repo/HW1 and Run .bat file</a:t>
             </a:r>
             <a:endParaRPr lang="en-US" dirty="0"/>
           </a:p>
@@ -4238,22 +4586,22 @@
       </p:sp>
       <p:pic>
         <p:nvPicPr>
-          <p:cNvPr id="8" name="Picture 7"/>
+          <p:cNvPr id="7" name="Picture 6"/>
           <p:cNvPicPr>
             <a:picLocks noChangeAspect="1"/>
           </p:cNvPicPr>
           <p:nvPr/>
         </p:nvPicPr>
         <p:blipFill>
-          <a:blip r:embed="rId2"/>
+          <a:blip r:embed="rId3"/>
           <a:stretch>
             <a:fillRect/>
           </a:stretch>
         </p:blipFill>
         <p:spPr>
           <a:xfrm>
-            <a:off x="226529" y="859998"/>
-            <a:ext cx="3814141" cy="2568163"/>
+            <a:off x="342732" y="3886927"/>
+            <a:ext cx="3871295" cy="1630821"/>
           </a:xfrm>
           <a:prstGeom prst="rect">
             <a:avLst/>
@@ -4263,7 +4611,7 @@
     </p:spTree>
     <p:extLst>
       <p:ext uri="{BB962C8B-B14F-4D97-AF65-F5344CB8AC3E}">
-        <p14:creationId xmlns:p14="http://schemas.microsoft.com/office/powerpoint/2010/main" val="828569764"/>
+        <p14:creationId xmlns:p14="http://schemas.microsoft.com/office/powerpoint/2010/main" val="2705974047"/>
       </p:ext>
     </p:extLst>
   </p:cSld>

</xml_diff>